<commit_message>
Changes for Python 3, aded an intermediary step to show how to go from pattern match to data in URL
</commit_message>
<xml_diff>
--- a/Python Level 2/Lesson 7/Session 7.pptx
+++ b/Python Level 2/Lesson 7/Session 7.pptx
@@ -12,7 +12,9 @@
     <p:sldId id="260" r:id="rId6"/>
     <p:sldId id="261" r:id="rId7"/>
     <p:sldId id="263" r:id="rId8"/>
-    <p:sldId id="262" r:id="rId9"/>
+    <p:sldId id="264" r:id="rId9"/>
+    <p:sldId id="265" r:id="rId10"/>
+    <p:sldId id="262" r:id="rId11"/>
   </p:sldIdLst>
   <p:sldSz cx="12192000" cy="6858000"/>
   <p:notesSz cx="6858000" cy="9144000"/>
@@ -248,7 +250,7 @@
           <a:p>
             <a:fld id="{17EC7085-4ACF-E149-9313-E1E217828D9B}" type="datetimeFigureOut">
               <a:rPr lang="en-US" smtClean="0"/>
-              <a:t>7/4/18</a:t>
+              <a:t>11/6/18</a:t>
             </a:fld>
             <a:endParaRPr lang="en-US"/>
           </a:p>
@@ -416,7 +418,7 @@
           <a:p>
             <a:fld id="{17EC7085-4ACF-E149-9313-E1E217828D9B}" type="datetimeFigureOut">
               <a:rPr lang="en-US" smtClean="0"/>
-              <a:t>7/4/18</a:t>
+              <a:t>11/6/18</a:t>
             </a:fld>
             <a:endParaRPr lang="en-US"/>
           </a:p>
@@ -594,7 +596,7 @@
           <a:p>
             <a:fld id="{17EC7085-4ACF-E149-9313-E1E217828D9B}" type="datetimeFigureOut">
               <a:rPr lang="en-US" smtClean="0"/>
-              <a:t>7/4/18</a:t>
+              <a:t>11/6/18</a:t>
             </a:fld>
             <a:endParaRPr lang="en-US"/>
           </a:p>
@@ -762,7 +764,7 @@
           <a:p>
             <a:fld id="{17EC7085-4ACF-E149-9313-E1E217828D9B}" type="datetimeFigureOut">
               <a:rPr lang="en-US" smtClean="0"/>
-              <a:t>7/4/18</a:t>
+              <a:t>11/6/18</a:t>
             </a:fld>
             <a:endParaRPr lang="en-US"/>
           </a:p>
@@ -1007,7 +1009,7 @@
           <a:p>
             <a:fld id="{17EC7085-4ACF-E149-9313-E1E217828D9B}" type="datetimeFigureOut">
               <a:rPr lang="en-US" smtClean="0"/>
-              <a:t>7/4/18</a:t>
+              <a:t>11/6/18</a:t>
             </a:fld>
             <a:endParaRPr lang="en-US"/>
           </a:p>
@@ -1236,7 +1238,7 @@
           <a:p>
             <a:fld id="{17EC7085-4ACF-E149-9313-E1E217828D9B}" type="datetimeFigureOut">
               <a:rPr lang="en-US" smtClean="0"/>
-              <a:t>7/4/18</a:t>
+              <a:t>11/6/18</a:t>
             </a:fld>
             <a:endParaRPr lang="en-US"/>
           </a:p>
@@ -1600,7 +1602,7 @@
           <a:p>
             <a:fld id="{17EC7085-4ACF-E149-9313-E1E217828D9B}" type="datetimeFigureOut">
               <a:rPr lang="en-US" smtClean="0"/>
-              <a:t>7/4/18</a:t>
+              <a:t>11/6/18</a:t>
             </a:fld>
             <a:endParaRPr lang="en-US"/>
           </a:p>
@@ -1717,7 +1719,7 @@
           <a:p>
             <a:fld id="{17EC7085-4ACF-E149-9313-E1E217828D9B}" type="datetimeFigureOut">
               <a:rPr lang="en-US" smtClean="0"/>
-              <a:t>7/4/18</a:t>
+              <a:t>11/6/18</a:t>
             </a:fld>
             <a:endParaRPr lang="en-US"/>
           </a:p>
@@ -1812,7 +1814,7 @@
           <a:p>
             <a:fld id="{17EC7085-4ACF-E149-9313-E1E217828D9B}" type="datetimeFigureOut">
               <a:rPr lang="en-US" smtClean="0"/>
-              <a:t>7/4/18</a:t>
+              <a:t>11/6/18</a:t>
             </a:fld>
             <a:endParaRPr lang="en-US"/>
           </a:p>
@@ -2087,7 +2089,7 @@
           <a:p>
             <a:fld id="{17EC7085-4ACF-E149-9313-E1E217828D9B}" type="datetimeFigureOut">
               <a:rPr lang="en-US" smtClean="0"/>
-              <a:t>7/4/18</a:t>
+              <a:t>11/6/18</a:t>
             </a:fld>
             <a:endParaRPr lang="en-US"/>
           </a:p>
@@ -2339,7 +2341,7 @@
           <a:p>
             <a:fld id="{17EC7085-4ACF-E149-9313-E1E217828D9B}" type="datetimeFigureOut">
               <a:rPr lang="en-US" smtClean="0"/>
-              <a:t>7/4/18</a:t>
+              <a:t>11/6/18</a:t>
             </a:fld>
             <a:endParaRPr lang="en-US"/>
           </a:p>
@@ -2550,7 +2552,7 @@
           <a:p>
             <a:fld id="{17EC7085-4ACF-E149-9313-E1E217828D9B}" type="datetimeFigureOut">
               <a:rPr lang="en-US" smtClean="0"/>
-              <a:t>7/4/18</a:t>
+              <a:t>11/6/18</a:t>
             </a:fld>
             <a:endParaRPr lang="en-US"/>
           </a:p>
@@ -3114,7 +3116,7 @@
 </p:sld>
 </file>
 
-<file path=ppt/slides/slide2.xml><?xml version="1.0" encoding="utf-8"?>
+<file path=ppt/slides/slide10.xml><?xml version="1.0" encoding="utf-8"?>
 <p:sld xmlns:a="http://schemas.openxmlformats.org/drawingml/2006/main" xmlns:r="http://schemas.openxmlformats.org/officeDocument/2006/relationships" xmlns:p="http://schemas.openxmlformats.org/presentationml/2006/main">
   <p:cSld>
     <p:spTree>
@@ -3133,249 +3135,62 @@
       </p:grpSpPr>
       <p:sp>
         <p:nvSpPr>
-          <p:cNvPr id="5" name="Title 1"/>
-          <p:cNvSpPr txBox="1">
-            <a:spLocks/>
-          </p:cNvSpPr>
+          <p:cNvPr id="2" name="Title 1"/>
+          <p:cNvSpPr>
+            <a:spLocks noGrp="1"/>
+          </p:cNvSpPr>
+          <p:nvPr>
+            <p:ph type="title"/>
+          </p:nvPr>
+        </p:nvSpPr>
+        <p:spPr/>
+        <p:txBody>
+          <a:bodyPr/>
+          <a:lstStyle/>
+          <a:p>
+            <a:pPr algn="ctr"/>
+            <a:r>
+              <a:rPr lang="en-US" dirty="0"/>
+              <a:t>Back to our webserver</a:t>
+            </a:r>
+          </a:p>
+        </p:txBody>
+      </p:sp>
+      <p:sp>
+        <p:nvSpPr>
+          <p:cNvPr id="6" name="Rectangle 5"/>
+          <p:cNvSpPr/>
           <p:nvPr/>
         </p:nvSpPr>
         <p:spPr>
           <a:xfrm>
-            <a:off x="838200" y="365125"/>
-            <a:ext cx="10515600" cy="1325563"/>
+            <a:off x="2438400" y="5992297"/>
+            <a:ext cx="7315200" cy="369332"/>
           </a:xfrm>
           <a:prstGeom prst="rect">
             <a:avLst/>
           </a:prstGeom>
         </p:spPr>
         <p:txBody>
-          <a:bodyPr vert="horz" lIns="91440" tIns="45720" rIns="91440" bIns="45720" rtlCol="0" anchor="ctr">
-            <a:normAutofit/>
+          <a:bodyPr wrap="square">
+            <a:spAutoFit/>
           </a:bodyPr>
-          <a:lstStyle>
-            <a:lvl1pPr algn="ctr" defTabSz="914400" rtl="0" eaLnBrk="1" latinLnBrk="0" hangingPunct="1">
-              <a:lnSpc>
-                <a:spcPct val="90000"/>
-              </a:lnSpc>
-              <a:spcBef>
-                <a:spcPct val="0"/>
-              </a:spcBef>
-              <a:buNone/>
-              <a:defRPr sz="6000" kern="1200">
-                <a:solidFill>
-                  <a:schemeClr val="tx1"/>
-                </a:solidFill>
-                <a:latin typeface="+mj-lt"/>
-                <a:ea typeface="+mj-ea"/>
-                <a:cs typeface="+mj-cs"/>
-              </a:defRPr>
-            </a:lvl1pPr>
-          </a:lstStyle>
-          <a:p>
-            <a:r>
-              <a:rPr lang="en-US" sz="4400" dirty="0"/>
-              <a:t>Last time</a:t>
-            </a:r>
-          </a:p>
-        </p:txBody>
-      </p:sp>
-      <p:sp>
-        <p:nvSpPr>
-          <p:cNvPr id="6" name="Content Placeholder 2"/>
-          <p:cNvSpPr txBox="1">
-            <a:spLocks/>
-          </p:cNvSpPr>
-          <p:nvPr/>
-        </p:nvSpPr>
-        <p:spPr>
-          <a:xfrm>
-            <a:off x="838200" y="1825625"/>
-            <a:ext cx="10515600" cy="4351338"/>
-          </a:xfrm>
-          <a:prstGeom prst="rect">
-            <a:avLst/>
-          </a:prstGeom>
-        </p:spPr>
-        <p:txBody>
-          <a:bodyPr vert="horz" lIns="91440" tIns="45720" rIns="91440" bIns="45720" rtlCol="0">
-            <a:normAutofit/>
-          </a:bodyPr>
-          <a:lstStyle>
-            <a:lvl1pPr marL="0" indent="0" algn="ctr" defTabSz="914400" rtl="0" eaLnBrk="1" latinLnBrk="0" hangingPunct="1">
-              <a:lnSpc>
-                <a:spcPct val="90000"/>
-              </a:lnSpc>
-              <a:spcBef>
-                <a:spcPts val="1000"/>
-              </a:spcBef>
-              <a:buFont typeface="Arial"/>
-              <a:buNone/>
-              <a:defRPr sz="2400" kern="1200">
-                <a:solidFill>
-                  <a:schemeClr val="tx1"/>
-                </a:solidFill>
-                <a:latin typeface="+mn-lt"/>
-                <a:ea typeface="+mn-ea"/>
-                <a:cs typeface="+mn-cs"/>
-              </a:defRPr>
-            </a:lvl1pPr>
-            <a:lvl2pPr marL="457200" indent="0" algn="ctr" defTabSz="914400" rtl="0" eaLnBrk="1" latinLnBrk="0" hangingPunct="1">
-              <a:lnSpc>
-                <a:spcPct val="90000"/>
-              </a:lnSpc>
-              <a:spcBef>
-                <a:spcPts val="500"/>
-              </a:spcBef>
-              <a:buFont typeface="Arial"/>
-              <a:buNone/>
-              <a:defRPr sz="2000" kern="1200">
-                <a:solidFill>
-                  <a:schemeClr val="tx1"/>
-                </a:solidFill>
-                <a:latin typeface="+mn-lt"/>
-                <a:ea typeface="+mn-ea"/>
-                <a:cs typeface="+mn-cs"/>
-              </a:defRPr>
-            </a:lvl2pPr>
-            <a:lvl3pPr marL="914400" indent="0" algn="ctr" defTabSz="914400" rtl="0" eaLnBrk="1" latinLnBrk="0" hangingPunct="1">
-              <a:lnSpc>
-                <a:spcPct val="90000"/>
-              </a:lnSpc>
-              <a:spcBef>
-                <a:spcPts val="500"/>
-              </a:spcBef>
-              <a:buFont typeface="Arial"/>
-              <a:buNone/>
-              <a:defRPr sz="1800" kern="1200">
-                <a:solidFill>
-                  <a:schemeClr val="tx1"/>
-                </a:solidFill>
-                <a:latin typeface="+mn-lt"/>
-                <a:ea typeface="+mn-ea"/>
-                <a:cs typeface="+mn-cs"/>
-              </a:defRPr>
-            </a:lvl3pPr>
-            <a:lvl4pPr marL="1371600" indent="0" algn="ctr" defTabSz="914400" rtl="0" eaLnBrk="1" latinLnBrk="0" hangingPunct="1">
-              <a:lnSpc>
-                <a:spcPct val="90000"/>
-              </a:lnSpc>
-              <a:spcBef>
-                <a:spcPts val="500"/>
-              </a:spcBef>
-              <a:buFont typeface="Arial"/>
-              <a:buNone/>
-              <a:defRPr sz="1600" kern="1200">
-                <a:solidFill>
-                  <a:schemeClr val="tx1"/>
-                </a:solidFill>
-                <a:latin typeface="+mn-lt"/>
-                <a:ea typeface="+mn-ea"/>
-                <a:cs typeface="+mn-cs"/>
-              </a:defRPr>
-            </a:lvl4pPr>
-            <a:lvl5pPr marL="1828800" indent="0" algn="ctr" defTabSz="914400" rtl="0" eaLnBrk="1" latinLnBrk="0" hangingPunct="1">
-              <a:lnSpc>
-                <a:spcPct val="90000"/>
-              </a:lnSpc>
-              <a:spcBef>
-                <a:spcPts val="500"/>
-              </a:spcBef>
-              <a:buFont typeface="Arial"/>
-              <a:buNone/>
-              <a:defRPr sz="1600" kern="1200">
-                <a:solidFill>
-                  <a:schemeClr val="tx1"/>
-                </a:solidFill>
-                <a:latin typeface="+mn-lt"/>
-                <a:ea typeface="+mn-ea"/>
-                <a:cs typeface="+mn-cs"/>
-              </a:defRPr>
-            </a:lvl5pPr>
-            <a:lvl6pPr marL="2286000" indent="0" algn="ctr" defTabSz="914400" rtl="0" eaLnBrk="1" latinLnBrk="0" hangingPunct="1">
-              <a:lnSpc>
-                <a:spcPct val="90000"/>
-              </a:lnSpc>
-              <a:spcBef>
-                <a:spcPts val="500"/>
-              </a:spcBef>
-              <a:buFont typeface="Arial"/>
-              <a:buNone/>
-              <a:defRPr sz="1600" kern="1200">
-                <a:solidFill>
-                  <a:schemeClr val="tx1"/>
-                </a:solidFill>
-                <a:latin typeface="+mn-lt"/>
-                <a:ea typeface="+mn-ea"/>
-                <a:cs typeface="+mn-cs"/>
-              </a:defRPr>
-            </a:lvl6pPr>
-            <a:lvl7pPr marL="2743200" indent="0" algn="ctr" defTabSz="914400" rtl="0" eaLnBrk="1" latinLnBrk="0" hangingPunct="1">
-              <a:lnSpc>
-                <a:spcPct val="90000"/>
-              </a:lnSpc>
-              <a:spcBef>
-                <a:spcPts val="500"/>
-              </a:spcBef>
-              <a:buFont typeface="Arial"/>
-              <a:buNone/>
-              <a:defRPr sz="1600" kern="1200">
-                <a:solidFill>
-                  <a:schemeClr val="tx1"/>
-                </a:solidFill>
-                <a:latin typeface="+mn-lt"/>
-                <a:ea typeface="+mn-ea"/>
-                <a:cs typeface="+mn-cs"/>
-              </a:defRPr>
-            </a:lvl7pPr>
-            <a:lvl8pPr marL="3200400" indent="0" algn="ctr" defTabSz="914400" rtl="0" eaLnBrk="1" latinLnBrk="0" hangingPunct="1">
-              <a:lnSpc>
-                <a:spcPct val="90000"/>
-              </a:lnSpc>
-              <a:spcBef>
-                <a:spcPts val="500"/>
-              </a:spcBef>
-              <a:buFont typeface="Arial"/>
-              <a:buNone/>
-              <a:defRPr sz="1600" kern="1200">
-                <a:solidFill>
-                  <a:schemeClr val="tx1"/>
-                </a:solidFill>
-                <a:latin typeface="+mn-lt"/>
-                <a:ea typeface="+mn-ea"/>
-                <a:cs typeface="+mn-cs"/>
-              </a:defRPr>
-            </a:lvl8pPr>
-            <a:lvl9pPr marL="3657600" indent="0" algn="ctr" defTabSz="914400" rtl="0" eaLnBrk="1" latinLnBrk="0" hangingPunct="1">
-              <a:lnSpc>
-                <a:spcPct val="90000"/>
-              </a:lnSpc>
-              <a:spcBef>
-                <a:spcPts val="500"/>
-              </a:spcBef>
-              <a:buFont typeface="Arial"/>
-              <a:buNone/>
-              <a:defRPr sz="1600" kern="1200">
-                <a:solidFill>
-                  <a:schemeClr val="tx1"/>
-                </a:solidFill>
-                <a:latin typeface="+mn-lt"/>
-                <a:ea typeface="+mn-ea"/>
-                <a:cs typeface="+mn-cs"/>
-              </a:defRPr>
-            </a:lvl9pPr>
-          </a:lstStyle>
-          <a:p>
-            <a:endParaRPr lang="en-US" dirty="0"/>
+          <a:lstStyle/>
+          <a:p>
+            <a:pPr algn="ctr"/>
+            <a:endParaRPr lang="en-US" b="1" dirty="0"/>
           </a:p>
         </p:txBody>
       </p:sp>
       <p:pic>
         <p:nvPicPr>
-          <p:cNvPr id="2" name="Picture 1"/>
+          <p:cNvPr id="7" name="Content Placeholder 6"/>
           <p:cNvPicPr>
-            <a:picLocks noChangeAspect="1"/>
+            <a:picLocks noGrp="1" noChangeAspect="1"/>
           </p:cNvPicPr>
-          <p:nvPr/>
+          <p:nvPr>
+            <p:ph idx="1"/>
+          </p:nvPr>
         </p:nvPicPr>
         <p:blipFill>
           <a:blip r:embed="rId2">
@@ -3391,12 +3206,9 @@
         </p:blipFill>
         <p:spPr>
           <a:xfrm>
-            <a:off x="2548221" y="1826674"/>
-            <a:ext cx="7095557" cy="4350289"/>
-          </a:xfrm>
-          <a:prstGeom prst="rect">
-            <a:avLst/>
-          </a:prstGeom>
+            <a:off x="1835150" y="2147094"/>
+            <a:ext cx="8521700" cy="3708400"/>
+          </a:xfrm>
         </p:spPr>
       </p:pic>
       <p:pic>
@@ -3429,6 +3241,374 @@
           </a:prstGeom>
         </p:spPr>
       </p:pic>
+    </p:spTree>
+    <p:extLst>
+      <p:ext uri="{BB962C8B-B14F-4D97-AF65-F5344CB8AC3E}">
+        <p14:creationId xmlns:p14="http://schemas.microsoft.com/office/powerpoint/2010/main" val="1519335544"/>
+      </p:ext>
+    </p:extLst>
+  </p:cSld>
+  <p:clrMapOvr>
+    <a:masterClrMapping/>
+  </p:clrMapOvr>
+</p:sld>
+</file>
+
+<file path=ppt/slides/slide2.xml><?xml version="1.0" encoding="utf-8"?>
+<p:sld xmlns:a="http://schemas.openxmlformats.org/drawingml/2006/main" xmlns:r="http://schemas.openxmlformats.org/officeDocument/2006/relationships" xmlns:p="http://schemas.openxmlformats.org/presentationml/2006/main">
+  <p:cSld>
+    <p:spTree>
+      <p:nvGrpSpPr>
+        <p:cNvPr id="1" name=""/>
+        <p:cNvGrpSpPr/>
+        <p:nvPr/>
+      </p:nvGrpSpPr>
+      <p:grpSpPr>
+        <a:xfrm>
+          <a:off x="0" y="0"/>
+          <a:ext cx="0" cy="0"/>
+          <a:chOff x="0" y="0"/>
+          <a:chExt cx="0" cy="0"/>
+        </a:xfrm>
+      </p:grpSpPr>
+      <p:sp>
+        <p:nvSpPr>
+          <p:cNvPr id="5" name="Title 1"/>
+          <p:cNvSpPr txBox="1">
+            <a:spLocks/>
+          </p:cNvSpPr>
+          <p:nvPr/>
+        </p:nvSpPr>
+        <p:spPr>
+          <a:xfrm>
+            <a:off x="838200" y="365125"/>
+            <a:ext cx="10515600" cy="1325563"/>
+          </a:xfrm>
+          <a:prstGeom prst="rect">
+            <a:avLst/>
+          </a:prstGeom>
+        </p:spPr>
+        <p:txBody>
+          <a:bodyPr vert="horz" lIns="91440" tIns="45720" rIns="91440" bIns="45720" rtlCol="0" anchor="ctr">
+            <a:normAutofit/>
+          </a:bodyPr>
+          <a:lstStyle>
+            <a:lvl1pPr algn="ctr" defTabSz="914400" rtl="0" eaLnBrk="1" latinLnBrk="0" hangingPunct="1">
+              <a:lnSpc>
+                <a:spcPct val="90000"/>
+              </a:lnSpc>
+              <a:spcBef>
+                <a:spcPct val="0"/>
+              </a:spcBef>
+              <a:buNone/>
+              <a:defRPr sz="6000" kern="1200">
+                <a:solidFill>
+                  <a:schemeClr val="tx1"/>
+                </a:solidFill>
+                <a:latin typeface="+mj-lt"/>
+                <a:ea typeface="+mj-ea"/>
+                <a:cs typeface="+mj-cs"/>
+              </a:defRPr>
+            </a:lvl1pPr>
+          </a:lstStyle>
+          <a:p>
+            <a:r>
+              <a:rPr lang="en-US" sz="4400" dirty="0"/>
+              <a:t>Last time</a:t>
+            </a:r>
+          </a:p>
+        </p:txBody>
+      </p:sp>
+      <p:sp>
+        <p:nvSpPr>
+          <p:cNvPr id="6" name="Content Placeholder 2"/>
+          <p:cNvSpPr txBox="1">
+            <a:spLocks/>
+          </p:cNvSpPr>
+          <p:nvPr/>
+        </p:nvSpPr>
+        <p:spPr>
+          <a:xfrm>
+            <a:off x="838200" y="1825625"/>
+            <a:ext cx="10515600" cy="4351338"/>
+          </a:xfrm>
+          <a:prstGeom prst="rect">
+            <a:avLst/>
+          </a:prstGeom>
+        </p:spPr>
+        <p:txBody>
+          <a:bodyPr vert="horz" lIns="91440" tIns="45720" rIns="91440" bIns="45720" rtlCol="0">
+            <a:normAutofit/>
+          </a:bodyPr>
+          <a:lstStyle>
+            <a:lvl1pPr marL="0" indent="0" algn="ctr" defTabSz="914400" rtl="0" eaLnBrk="1" latinLnBrk="0" hangingPunct="1">
+              <a:lnSpc>
+                <a:spcPct val="90000"/>
+              </a:lnSpc>
+              <a:spcBef>
+                <a:spcPts val="1000"/>
+              </a:spcBef>
+              <a:buFont typeface="Arial"/>
+              <a:buNone/>
+              <a:defRPr sz="2400" kern="1200">
+                <a:solidFill>
+                  <a:schemeClr val="tx1"/>
+                </a:solidFill>
+                <a:latin typeface="+mn-lt"/>
+                <a:ea typeface="+mn-ea"/>
+                <a:cs typeface="+mn-cs"/>
+              </a:defRPr>
+            </a:lvl1pPr>
+            <a:lvl2pPr marL="457200" indent="0" algn="ctr" defTabSz="914400" rtl="0" eaLnBrk="1" latinLnBrk="0" hangingPunct="1">
+              <a:lnSpc>
+                <a:spcPct val="90000"/>
+              </a:lnSpc>
+              <a:spcBef>
+                <a:spcPts val="500"/>
+              </a:spcBef>
+              <a:buFont typeface="Arial"/>
+              <a:buNone/>
+              <a:defRPr sz="2000" kern="1200">
+                <a:solidFill>
+                  <a:schemeClr val="tx1"/>
+                </a:solidFill>
+                <a:latin typeface="+mn-lt"/>
+                <a:ea typeface="+mn-ea"/>
+                <a:cs typeface="+mn-cs"/>
+              </a:defRPr>
+            </a:lvl2pPr>
+            <a:lvl3pPr marL="914400" indent="0" algn="ctr" defTabSz="914400" rtl="0" eaLnBrk="1" latinLnBrk="0" hangingPunct="1">
+              <a:lnSpc>
+                <a:spcPct val="90000"/>
+              </a:lnSpc>
+              <a:spcBef>
+                <a:spcPts val="500"/>
+              </a:spcBef>
+              <a:buFont typeface="Arial"/>
+              <a:buNone/>
+              <a:defRPr sz="1800" kern="1200">
+                <a:solidFill>
+                  <a:schemeClr val="tx1"/>
+                </a:solidFill>
+                <a:latin typeface="+mn-lt"/>
+                <a:ea typeface="+mn-ea"/>
+                <a:cs typeface="+mn-cs"/>
+              </a:defRPr>
+            </a:lvl3pPr>
+            <a:lvl4pPr marL="1371600" indent="0" algn="ctr" defTabSz="914400" rtl="0" eaLnBrk="1" latinLnBrk="0" hangingPunct="1">
+              <a:lnSpc>
+                <a:spcPct val="90000"/>
+              </a:lnSpc>
+              <a:spcBef>
+                <a:spcPts val="500"/>
+              </a:spcBef>
+              <a:buFont typeface="Arial"/>
+              <a:buNone/>
+              <a:defRPr sz="1600" kern="1200">
+                <a:solidFill>
+                  <a:schemeClr val="tx1"/>
+                </a:solidFill>
+                <a:latin typeface="+mn-lt"/>
+                <a:ea typeface="+mn-ea"/>
+                <a:cs typeface="+mn-cs"/>
+              </a:defRPr>
+            </a:lvl4pPr>
+            <a:lvl5pPr marL="1828800" indent="0" algn="ctr" defTabSz="914400" rtl="0" eaLnBrk="1" latinLnBrk="0" hangingPunct="1">
+              <a:lnSpc>
+                <a:spcPct val="90000"/>
+              </a:lnSpc>
+              <a:spcBef>
+                <a:spcPts val="500"/>
+              </a:spcBef>
+              <a:buFont typeface="Arial"/>
+              <a:buNone/>
+              <a:defRPr sz="1600" kern="1200">
+                <a:solidFill>
+                  <a:schemeClr val="tx1"/>
+                </a:solidFill>
+                <a:latin typeface="+mn-lt"/>
+                <a:ea typeface="+mn-ea"/>
+                <a:cs typeface="+mn-cs"/>
+              </a:defRPr>
+            </a:lvl5pPr>
+            <a:lvl6pPr marL="2286000" indent="0" algn="ctr" defTabSz="914400" rtl="0" eaLnBrk="1" latinLnBrk="0" hangingPunct="1">
+              <a:lnSpc>
+                <a:spcPct val="90000"/>
+              </a:lnSpc>
+              <a:spcBef>
+                <a:spcPts val="500"/>
+              </a:spcBef>
+              <a:buFont typeface="Arial"/>
+              <a:buNone/>
+              <a:defRPr sz="1600" kern="1200">
+                <a:solidFill>
+                  <a:schemeClr val="tx1"/>
+                </a:solidFill>
+                <a:latin typeface="+mn-lt"/>
+                <a:ea typeface="+mn-ea"/>
+                <a:cs typeface="+mn-cs"/>
+              </a:defRPr>
+            </a:lvl6pPr>
+            <a:lvl7pPr marL="2743200" indent="0" algn="ctr" defTabSz="914400" rtl="0" eaLnBrk="1" latinLnBrk="0" hangingPunct="1">
+              <a:lnSpc>
+                <a:spcPct val="90000"/>
+              </a:lnSpc>
+              <a:spcBef>
+                <a:spcPts val="500"/>
+              </a:spcBef>
+              <a:buFont typeface="Arial"/>
+              <a:buNone/>
+              <a:defRPr sz="1600" kern="1200">
+                <a:solidFill>
+                  <a:schemeClr val="tx1"/>
+                </a:solidFill>
+                <a:latin typeface="+mn-lt"/>
+                <a:ea typeface="+mn-ea"/>
+                <a:cs typeface="+mn-cs"/>
+              </a:defRPr>
+            </a:lvl7pPr>
+            <a:lvl8pPr marL="3200400" indent="0" algn="ctr" defTabSz="914400" rtl="0" eaLnBrk="1" latinLnBrk="0" hangingPunct="1">
+              <a:lnSpc>
+                <a:spcPct val="90000"/>
+              </a:lnSpc>
+              <a:spcBef>
+                <a:spcPts val="500"/>
+              </a:spcBef>
+              <a:buFont typeface="Arial"/>
+              <a:buNone/>
+              <a:defRPr sz="1600" kern="1200">
+                <a:solidFill>
+                  <a:schemeClr val="tx1"/>
+                </a:solidFill>
+                <a:latin typeface="+mn-lt"/>
+                <a:ea typeface="+mn-ea"/>
+                <a:cs typeface="+mn-cs"/>
+              </a:defRPr>
+            </a:lvl8pPr>
+            <a:lvl9pPr marL="3657600" indent="0" algn="ctr" defTabSz="914400" rtl="0" eaLnBrk="1" latinLnBrk="0" hangingPunct="1">
+              <a:lnSpc>
+                <a:spcPct val="90000"/>
+              </a:lnSpc>
+              <a:spcBef>
+                <a:spcPts val="500"/>
+              </a:spcBef>
+              <a:buFont typeface="Arial"/>
+              <a:buNone/>
+              <a:defRPr sz="1600" kern="1200">
+                <a:solidFill>
+                  <a:schemeClr val="tx1"/>
+                </a:solidFill>
+                <a:latin typeface="+mn-lt"/>
+                <a:ea typeface="+mn-ea"/>
+                <a:cs typeface="+mn-cs"/>
+              </a:defRPr>
+            </a:lvl9pPr>
+          </a:lstStyle>
+          <a:p>
+            <a:endParaRPr lang="en-US" dirty="0"/>
+          </a:p>
+        </p:txBody>
+      </p:sp>
+      <p:pic>
+        <p:nvPicPr>
+          <p:cNvPr id="2" name="Picture 1"/>
+          <p:cNvPicPr>
+            <a:picLocks noChangeAspect="1"/>
+          </p:cNvPicPr>
+          <p:nvPr/>
+        </p:nvPicPr>
+        <p:blipFill>
+          <a:blip r:embed="rId2">
+            <a:extLst>
+              <a:ext uri="{28A0092B-C50C-407E-A947-70E740481C1C}">
+                <a14:useLocalDpi xmlns:a14="http://schemas.microsoft.com/office/drawing/2010/main" val="0"/>
+              </a:ext>
+            </a:extLst>
+          </a:blip>
+          <a:stretch>
+            <a:fillRect/>
+          </a:stretch>
+        </p:blipFill>
+        <p:spPr>
+          <a:xfrm>
+            <a:off x="2593101" y="1457342"/>
+            <a:ext cx="7095557" cy="4350289"/>
+          </a:xfrm>
+          <a:prstGeom prst="rect">
+            <a:avLst/>
+          </a:prstGeom>
+        </p:spPr>
+      </p:pic>
+      <p:pic>
+        <p:nvPicPr>
+          <p:cNvPr id="4" name="Picture 3"/>
+          <p:cNvPicPr>
+            <a:picLocks noChangeAspect="1"/>
+          </p:cNvPicPr>
+          <p:nvPr/>
+        </p:nvPicPr>
+        <p:blipFill>
+          <a:blip r:embed="rId3">
+            <a:extLst>
+              <a:ext uri="{28A0092B-C50C-407E-A947-70E740481C1C}">
+                <a14:useLocalDpi xmlns:a14="http://schemas.microsoft.com/office/drawing/2010/main" val="0"/>
+              </a:ext>
+            </a:extLst>
+          </a:blip>
+          <a:stretch>
+            <a:fillRect/>
+          </a:stretch>
+        </p:blipFill>
+        <p:spPr>
+          <a:xfrm>
+            <a:off x="9801412" y="4624575"/>
+            <a:ext cx="1552388" cy="1552388"/>
+          </a:xfrm>
+          <a:prstGeom prst="rect">
+            <a:avLst/>
+          </a:prstGeom>
+        </p:spPr>
+      </p:pic>
+      <p:sp>
+        <p:nvSpPr>
+          <p:cNvPr id="3" name="TextBox 2">
+            <a:extLst>
+              <a:ext uri="{FF2B5EF4-FFF2-40B4-BE49-F238E27FC236}">
+                <a16:creationId xmlns:a16="http://schemas.microsoft.com/office/drawing/2014/main" id="{91B94315-C588-7146-B4D7-E3C0455BCD1E}"/>
+              </a:ext>
+            </a:extLst>
+          </p:cNvPr>
+          <p:cNvSpPr txBox="1"/>
+          <p:nvPr/>
+        </p:nvSpPr>
+        <p:spPr>
+          <a:xfrm>
+            <a:off x="1882790" y="6127234"/>
+            <a:ext cx="8516177" cy="369332"/>
+          </a:xfrm>
+          <a:prstGeom prst="rect">
+            <a:avLst/>
+          </a:prstGeom>
+          <a:noFill/>
+        </p:spPr>
+        <p:txBody>
+          <a:bodyPr wrap="none" rtlCol="0">
+            <a:spAutoFit/>
+          </a:bodyPr>
+          <a:lstStyle/>
+          <a:p>
+            <a:r>
+              <a:rPr lang="en-US" dirty="0"/>
+              <a:t>We beat our heads against Python 3.7 changes that broke the released version of </a:t>
+            </a:r>
+            <a:r>
+              <a:rPr lang="en-US" dirty="0" err="1"/>
+              <a:t>web.py</a:t>
+            </a:r>
+            <a:endParaRPr lang="en-US" dirty="0"/>
+          </a:p>
+        </p:txBody>
+      </p:sp>
     </p:spTree>
     <p:extLst>
       <p:ext uri="{BB962C8B-B14F-4D97-AF65-F5344CB8AC3E}">
@@ -3549,8 +3729,8 @@
         </p:nvSpPr>
         <p:spPr>
           <a:xfrm>
-            <a:off x="3892448" y="5607596"/>
-            <a:ext cx="4407104" cy="461665"/>
+            <a:off x="3304819" y="5607596"/>
+            <a:ext cx="5582362" cy="461665"/>
           </a:xfrm>
           <a:prstGeom prst="rect">
             <a:avLst/>
@@ -3565,17 +3745,15 @@
           <a:p>
             <a:r>
               <a:rPr lang="en-US" sz="2400" dirty="0"/>
-              <a:t>Today’s code: </a:t>
-            </a:r>
-            <a:r>
-              <a:rPr lang="en-US" sz="2400" dirty="0">
-                <a:hlinkClick r:id="rId4"/>
-              </a:rPr>
-              <a:t>http://go/0a13yzbs</a:t>
+              <a:t>Today’s code: http://</a:t>
+            </a:r>
+            <a:r>
+              <a:rPr lang="en-US" sz="2400" dirty="0" err="1"/>
+              <a:t>eca</a:t>
             </a:r>
             <a:r>
               <a:rPr lang="en-US" sz="2400" dirty="0"/>
-              <a:t> </a:t>
+              <a:t>-python/l2session7</a:t>
             </a:r>
           </a:p>
         </p:txBody>
@@ -3668,7 +3846,7 @@
       </p:sp>
       <p:pic>
         <p:nvPicPr>
-          <p:cNvPr id="6" name="Picture 5"/>
+          <p:cNvPr id="4" name="Picture 3"/>
           <p:cNvPicPr>
             <a:picLocks noChangeAspect="1"/>
           </p:cNvPicPr>
@@ -3688,8 +3866,8 @@
         </p:blipFill>
         <p:spPr>
           <a:xfrm>
-            <a:off x="1466850" y="2702560"/>
-            <a:ext cx="9258300" cy="3251200"/>
+            <a:off x="9801412" y="4624575"/>
+            <a:ext cx="1552388" cy="1552388"/>
           </a:xfrm>
           <a:prstGeom prst="rect">
             <a:avLst/>
@@ -3698,28 +3876,28 @@
       </p:pic>
       <p:pic>
         <p:nvPicPr>
-          <p:cNvPr id="4" name="Picture 3"/>
+          <p:cNvPr id="11" name="Picture 10">
+            <a:extLst>
+              <a:ext uri="{FF2B5EF4-FFF2-40B4-BE49-F238E27FC236}">
+                <a16:creationId xmlns:a16="http://schemas.microsoft.com/office/drawing/2014/main" id="{FC18DEB7-FC77-894E-801F-D57EF0078F70}"/>
+              </a:ext>
+            </a:extLst>
+          </p:cNvPr>
           <p:cNvPicPr>
             <a:picLocks noChangeAspect="1"/>
           </p:cNvPicPr>
           <p:nvPr/>
         </p:nvPicPr>
         <p:blipFill>
-          <a:blip r:embed="rId3">
-            <a:extLst>
-              <a:ext uri="{28A0092B-C50C-407E-A947-70E740481C1C}">
-                <a14:useLocalDpi xmlns:a14="http://schemas.microsoft.com/office/drawing/2010/main" val="0"/>
-              </a:ext>
-            </a:extLst>
-          </a:blip>
+          <a:blip r:embed="rId3"/>
           <a:stretch>
             <a:fillRect/>
           </a:stretch>
         </p:blipFill>
         <p:spPr>
           <a:xfrm>
-            <a:off x="9801412" y="4624575"/>
-            <a:ext cx="1552388" cy="1552388"/>
+            <a:off x="1770156" y="3241769"/>
+            <a:ext cx="7099300" cy="2159000"/>
           </a:xfrm>
           <a:prstGeom prst="rect">
             <a:avLst/>
@@ -3781,13 +3959,11 @@
       </p:sp>
       <p:pic>
         <p:nvPicPr>
-          <p:cNvPr id="5" name="Content Placeholder 4"/>
+          <p:cNvPr id="4" name="Picture 3"/>
           <p:cNvPicPr>
-            <a:picLocks noGrp="1" noChangeAspect="1"/>
+            <a:picLocks noChangeAspect="1"/>
           </p:cNvPicPr>
-          <p:nvPr>
-            <p:ph idx="1"/>
-          </p:nvPr>
+          <p:nvPr/>
         </p:nvPicPr>
         <p:blipFill>
           <a:blip r:embed="rId2">
@@ -3803,39 +3979,41 @@
         </p:blipFill>
         <p:spPr>
           <a:xfrm>
-            <a:off x="2381250" y="2020094"/>
-            <a:ext cx="7429500" cy="3962400"/>
-          </a:xfrm>
+            <a:off x="9801412" y="4624575"/>
+            <a:ext cx="1552388" cy="1552388"/>
+          </a:xfrm>
+          <a:prstGeom prst="rect">
+            <a:avLst/>
+          </a:prstGeom>
         </p:spPr>
       </p:pic>
       <p:pic>
         <p:nvPicPr>
-          <p:cNvPr id="4" name="Picture 3"/>
+          <p:cNvPr id="8" name="Content Placeholder 7">
+            <a:extLst>
+              <a:ext uri="{FF2B5EF4-FFF2-40B4-BE49-F238E27FC236}">
+                <a16:creationId xmlns:a16="http://schemas.microsoft.com/office/drawing/2014/main" id="{DC06200F-64D3-2C4B-8603-3CA7EF5389B1}"/>
+              </a:ext>
+            </a:extLst>
+          </p:cNvPr>
           <p:cNvPicPr>
-            <a:picLocks noChangeAspect="1"/>
+            <a:picLocks noGrp="1" noChangeAspect="1"/>
           </p:cNvPicPr>
-          <p:nvPr/>
+          <p:nvPr>
+            <p:ph idx="1"/>
+          </p:nvPr>
         </p:nvPicPr>
         <p:blipFill>
-          <a:blip r:embed="rId3">
-            <a:extLst>
-              <a:ext uri="{28A0092B-C50C-407E-A947-70E740481C1C}">
-                <a14:useLocalDpi xmlns:a14="http://schemas.microsoft.com/office/drawing/2010/main" val="0"/>
-              </a:ext>
-            </a:extLst>
-          </a:blip>
+          <a:blip r:embed="rId3"/>
           <a:stretch>
             <a:fillRect/>
           </a:stretch>
         </p:blipFill>
         <p:spPr>
           <a:xfrm>
-            <a:off x="9801412" y="4624575"/>
-            <a:ext cx="1552388" cy="1552388"/>
-          </a:xfrm>
-          <a:prstGeom prst="rect">
-            <a:avLst/>
-          </a:prstGeom>
+            <a:off x="2127250" y="1918494"/>
+            <a:ext cx="7937500" cy="4165600"/>
+          </a:xfrm>
         </p:spPr>
       </p:pic>
     </p:spTree>
@@ -3891,15 +4069,42 @@
           </a:p>
         </p:txBody>
       </p:sp>
+      <p:sp>
+        <p:nvSpPr>
+          <p:cNvPr id="6" name="TextBox 5"/>
+          <p:cNvSpPr txBox="1"/>
+          <p:nvPr/>
+        </p:nvSpPr>
+        <p:spPr>
+          <a:xfrm>
+            <a:off x="3164491" y="3495326"/>
+            <a:ext cx="5857822" cy="369332"/>
+          </a:xfrm>
+          <a:prstGeom prst="rect">
+            <a:avLst/>
+          </a:prstGeom>
+          <a:noFill/>
+        </p:spPr>
+        <p:txBody>
+          <a:bodyPr wrap="none" rtlCol="0">
+            <a:spAutoFit/>
+          </a:bodyPr>
+          <a:lstStyle/>
+          <a:p>
+            <a:r>
+              <a:rPr lang="en-US" dirty="0"/>
+              <a:t>Square brackets denote a match from a group of characters: </a:t>
+            </a:r>
+          </a:p>
+        </p:txBody>
+      </p:sp>
       <p:pic>
         <p:nvPicPr>
-          <p:cNvPr id="4" name="Content Placeholder 3"/>
+          <p:cNvPr id="8" name="Picture 7"/>
           <p:cNvPicPr>
-            <a:picLocks noGrp="1" noChangeAspect="1"/>
+            <a:picLocks noChangeAspect="1"/>
           </p:cNvPicPr>
-          <p:nvPr>
-            <p:ph idx="1"/>
-          </p:nvPr>
+          <p:nvPr/>
         </p:nvPicPr>
         <p:blipFill>
           <a:blip r:embed="rId2">
@@ -3915,48 +4120,17 @@
         </p:blipFill>
         <p:spPr>
           <a:xfrm>
-            <a:off x="1609199" y="1940812"/>
-            <a:ext cx="8968407" cy="2433638"/>
-          </a:xfrm>
-        </p:spPr>
-      </p:pic>
-      <p:sp>
-        <p:nvSpPr>
-          <p:cNvPr id="6" name="TextBox 5"/>
-          <p:cNvSpPr txBox="1"/>
-          <p:nvPr/>
-        </p:nvSpPr>
-        <p:spPr>
-          <a:xfrm>
-            <a:off x="3164491" y="4760072"/>
-            <a:ext cx="5857822" cy="369332"/>
+            <a:off x="1996353" y="4385777"/>
+            <a:ext cx="8194098" cy="888249"/>
           </a:xfrm>
           <a:prstGeom prst="rect">
             <a:avLst/>
           </a:prstGeom>
-          <a:noFill/>
-        </p:spPr>
-        <p:txBody>
-          <a:bodyPr wrap="none" rtlCol="0">
-            <a:spAutoFit/>
-          </a:bodyPr>
-          <a:lstStyle/>
-          <a:p>
-            <a:r>
-              <a:rPr lang="en-US" dirty="0"/>
-              <a:t>Square brackets denote a match from a group </a:t>
-            </a:r>
-            <a:r>
-              <a:rPr lang="en-US"/>
-              <a:t>of characters: </a:t>
-            </a:r>
-            <a:endParaRPr lang="en-US" dirty="0"/>
-          </a:p>
-        </p:txBody>
-      </p:sp>
+        </p:spPr>
+      </p:pic>
       <p:pic>
         <p:nvPicPr>
-          <p:cNvPr id="8" name="Picture 7"/>
+          <p:cNvPr id="5" name="Picture 4"/>
           <p:cNvPicPr>
             <a:picLocks noChangeAspect="1"/>
           </p:cNvPicPr>
@@ -3976,8 +4150,8 @@
         </p:blipFill>
         <p:spPr>
           <a:xfrm>
-            <a:off x="1996353" y="5515026"/>
-            <a:ext cx="8194098" cy="888249"/>
+            <a:off x="9801412" y="4624575"/>
+            <a:ext cx="1552388" cy="1552388"/>
           </a:xfrm>
           <a:prstGeom prst="rect">
             <a:avLst/>
@@ -3986,32 +4160,31 @@
       </p:pic>
       <p:pic>
         <p:nvPicPr>
-          <p:cNvPr id="5" name="Picture 4"/>
+          <p:cNvPr id="12" name="Content Placeholder 11">
+            <a:extLst>
+              <a:ext uri="{FF2B5EF4-FFF2-40B4-BE49-F238E27FC236}">
+                <a16:creationId xmlns:a16="http://schemas.microsoft.com/office/drawing/2014/main" id="{2F4A3C2A-9709-EA47-9953-191401A64A5B}"/>
+              </a:ext>
+            </a:extLst>
+          </p:cNvPr>
           <p:cNvPicPr>
-            <a:picLocks noChangeAspect="1"/>
+            <a:picLocks noGrp="1" noChangeAspect="1"/>
           </p:cNvPicPr>
-          <p:nvPr/>
+          <p:nvPr>
+            <p:ph idx="1"/>
+          </p:nvPr>
         </p:nvPicPr>
         <p:blipFill>
-          <a:blip r:embed="rId4">
-            <a:extLst>
-              <a:ext uri="{28A0092B-C50C-407E-A947-70E740481C1C}">
-                <a14:useLocalDpi xmlns:a14="http://schemas.microsoft.com/office/drawing/2010/main" val="0"/>
-              </a:ext>
-            </a:extLst>
-          </a:blip>
+          <a:blip r:embed="rId4"/>
           <a:stretch>
             <a:fillRect/>
           </a:stretch>
         </p:blipFill>
         <p:spPr>
           <a:xfrm>
-            <a:off x="9801412" y="4624575"/>
-            <a:ext cx="1552388" cy="1552388"/>
-          </a:xfrm>
-          <a:prstGeom prst="rect">
-            <a:avLst/>
-          </a:prstGeom>
+            <a:off x="3164491" y="1716907"/>
+            <a:ext cx="5816600" cy="1257300"/>
+          </a:xfrm>
         </p:spPr>
       </p:pic>
     </p:spTree>
@@ -4223,7 +4396,13 @@
       </p:grpSpPr>
       <p:sp>
         <p:nvSpPr>
-          <p:cNvPr id="2" name="Title 1"/>
+          <p:cNvPr id="2" name="Title 1">
+            <a:extLst>
+              <a:ext uri="{FF2B5EF4-FFF2-40B4-BE49-F238E27FC236}">
+                <a16:creationId xmlns:a16="http://schemas.microsoft.com/office/drawing/2014/main" id="{3BA07174-3265-D646-AD56-93BC2B389A27}"/>
+              </a:ext>
+            </a:extLst>
+          </p:cNvPr>
           <p:cNvSpPr>
             <a:spLocks noGrp="1"/>
           </p:cNvSpPr>
@@ -4239,40 +4418,20 @@
             <a:pPr algn="ctr"/>
             <a:r>
               <a:rPr lang="en-US" dirty="0"/>
-              <a:t>Back to our webserver</a:t>
-            </a:r>
-          </a:p>
-        </p:txBody>
-      </p:sp>
-      <p:sp>
-        <p:nvSpPr>
-          <p:cNvPr id="6" name="Rectangle 5"/>
-          <p:cNvSpPr/>
-          <p:nvPr/>
-        </p:nvSpPr>
-        <p:spPr>
-          <a:xfrm>
-            <a:off x="2438400" y="5992297"/>
-            <a:ext cx="7315200" cy="369332"/>
-          </a:xfrm>
-          <a:prstGeom prst="rect">
-            <a:avLst/>
-          </a:prstGeom>
-        </p:spPr>
-        <p:txBody>
-          <a:bodyPr wrap="square">
-            <a:spAutoFit/>
-          </a:bodyPr>
-          <a:lstStyle/>
-          <a:p>
-            <a:pPr algn="ctr"/>
-            <a:endParaRPr lang="en-US" b="1" dirty="0"/>
+              <a:t>Saying “Hello!”</a:t>
+            </a:r>
           </a:p>
         </p:txBody>
       </p:sp>
       <p:pic>
         <p:nvPicPr>
-          <p:cNvPr id="7" name="Content Placeholder 6"/>
+          <p:cNvPr id="11" name="Content Placeholder 10">
+            <a:extLst>
+              <a:ext uri="{FF2B5EF4-FFF2-40B4-BE49-F238E27FC236}">
+                <a16:creationId xmlns:a16="http://schemas.microsoft.com/office/drawing/2014/main" id="{BEEEBB05-56A8-5C44-AD0F-E1DD48AC3DCB}"/>
+              </a:ext>
+            </a:extLst>
+          </p:cNvPr>
           <p:cNvPicPr>
             <a:picLocks noGrp="1" noChangeAspect="1"/>
           </p:cNvPicPr>
@@ -4281,27 +4440,27 @@
           </p:nvPr>
         </p:nvPicPr>
         <p:blipFill>
-          <a:blip r:embed="rId2">
-            <a:extLst>
-              <a:ext uri="{28A0092B-C50C-407E-A947-70E740481C1C}">
-                <a14:useLocalDpi xmlns:a14="http://schemas.microsoft.com/office/drawing/2010/main" val="0"/>
-              </a:ext>
-            </a:extLst>
-          </a:blip>
+          <a:blip r:embed="rId2"/>
           <a:stretch>
             <a:fillRect/>
           </a:stretch>
         </p:blipFill>
         <p:spPr>
           <a:xfrm>
-            <a:off x="1835150" y="2147094"/>
-            <a:ext cx="8521700" cy="3708400"/>
+            <a:off x="1876023" y="1690688"/>
+            <a:ext cx="8439953" cy="4351338"/>
           </a:xfrm>
         </p:spPr>
       </p:pic>
       <p:pic>
         <p:nvPicPr>
-          <p:cNvPr id="4" name="Picture 3"/>
+          <p:cNvPr id="5" name="Picture 4">
+            <a:extLst>
+              <a:ext uri="{FF2B5EF4-FFF2-40B4-BE49-F238E27FC236}">
+                <a16:creationId xmlns:a16="http://schemas.microsoft.com/office/drawing/2014/main" id="{767D7A40-3D98-3F4F-9A99-364A18D05479}"/>
+              </a:ext>
+            </a:extLst>
+          </p:cNvPr>
           <p:cNvPicPr>
             <a:picLocks noChangeAspect="1"/>
           </p:cNvPicPr>
@@ -4332,7 +4491,162 @@
     </p:spTree>
     <p:extLst>
       <p:ext uri="{BB962C8B-B14F-4D97-AF65-F5344CB8AC3E}">
-        <p14:creationId xmlns:p14="http://schemas.microsoft.com/office/powerpoint/2010/main" val="1519335544"/>
+        <p14:creationId xmlns:p14="http://schemas.microsoft.com/office/powerpoint/2010/main" val="2167793744"/>
+      </p:ext>
+    </p:extLst>
+  </p:cSld>
+  <p:clrMapOvr>
+    <a:masterClrMapping/>
+  </p:clrMapOvr>
+</p:sld>
+</file>
+
+<file path=ppt/slides/slide9.xml><?xml version="1.0" encoding="utf-8"?>
+<p:sld xmlns:a="http://schemas.openxmlformats.org/drawingml/2006/main" xmlns:r="http://schemas.openxmlformats.org/officeDocument/2006/relationships" xmlns:p="http://schemas.openxmlformats.org/presentationml/2006/main">
+  <p:cSld>
+    <p:spTree>
+      <p:nvGrpSpPr>
+        <p:cNvPr id="1" name=""/>
+        <p:cNvGrpSpPr/>
+        <p:nvPr/>
+      </p:nvGrpSpPr>
+      <p:grpSpPr>
+        <a:xfrm>
+          <a:off x="0" y="0"/>
+          <a:ext cx="0" cy="0"/>
+          <a:chOff x="0" y="0"/>
+          <a:chExt cx="0" cy="0"/>
+        </a:xfrm>
+      </p:grpSpPr>
+      <p:sp>
+        <p:nvSpPr>
+          <p:cNvPr id="2" name="Title 1">
+            <a:extLst>
+              <a:ext uri="{FF2B5EF4-FFF2-40B4-BE49-F238E27FC236}">
+                <a16:creationId xmlns:a16="http://schemas.microsoft.com/office/drawing/2014/main" id="{71DA4FDC-DD61-214D-9946-901D1A49A2D5}"/>
+              </a:ext>
+            </a:extLst>
+          </p:cNvPr>
+          <p:cNvSpPr>
+            <a:spLocks noGrp="1"/>
+          </p:cNvSpPr>
+          <p:nvPr>
+            <p:ph type="title"/>
+          </p:nvPr>
+        </p:nvSpPr>
+        <p:spPr/>
+        <p:txBody>
+          <a:bodyPr/>
+          <a:lstStyle/>
+          <a:p>
+            <a:pPr algn="ctr"/>
+            <a:r>
+              <a:rPr lang="en-US" dirty="0"/>
+              <a:t>Back to our webserver</a:t>
+            </a:r>
+          </a:p>
+        </p:txBody>
+      </p:sp>
+      <p:sp>
+        <p:nvSpPr>
+          <p:cNvPr id="3" name="Content Placeholder 2">
+            <a:extLst>
+              <a:ext uri="{FF2B5EF4-FFF2-40B4-BE49-F238E27FC236}">
+                <a16:creationId xmlns:a16="http://schemas.microsoft.com/office/drawing/2014/main" id="{D3AC30F6-F8CC-BB42-B500-4D23CB6C7192}"/>
+              </a:ext>
+            </a:extLst>
+          </p:cNvPr>
+          <p:cNvSpPr>
+            <a:spLocks noGrp="1"/>
+          </p:cNvSpPr>
+          <p:nvPr>
+            <p:ph idx="1"/>
+          </p:nvPr>
+        </p:nvSpPr>
+        <p:spPr/>
+        <p:txBody>
+          <a:bodyPr/>
+          <a:lstStyle/>
+          <a:p>
+            <a:r>
+              <a:rPr lang="en-US" dirty="0"/>
+              <a:t>Modify your webserver code so that you can request all the restaurants that satisfy a given score, rating or distance:</a:t>
+            </a:r>
+          </a:p>
+          <a:p>
+            <a:endParaRPr lang="en-US" dirty="0"/>
+          </a:p>
+          <a:p>
+            <a:r>
+              <a:rPr lang="en-US" dirty="0"/>
+              <a:t>For example: </a:t>
+            </a:r>
+          </a:p>
+          <a:p>
+            <a:pPr lvl="1"/>
+            <a:r>
+              <a:rPr lang="en-US" dirty="0">
+                <a:hlinkClick r:id="rId2"/>
+              </a:rPr>
+              <a:t>http://127.0.0.1:8080/score/4</a:t>
+            </a:r>
+            <a:br>
+              <a:rPr lang="en-US" dirty="0"/>
+            </a:br>
+            <a:br>
+              <a:rPr lang="en-US" dirty="0"/>
+            </a:br>
+            <a:r>
+              <a:rPr lang="en-US" dirty="0"/>
+              <a:t>Lists all restaurants with a score of 4 or better</a:t>
+            </a:r>
+          </a:p>
+          <a:p>
+            <a:pPr lvl="1"/>
+            <a:endParaRPr lang="en-US" dirty="0"/>
+          </a:p>
+        </p:txBody>
+      </p:sp>
+      <p:pic>
+        <p:nvPicPr>
+          <p:cNvPr id="4" name="Picture 3">
+            <a:extLst>
+              <a:ext uri="{FF2B5EF4-FFF2-40B4-BE49-F238E27FC236}">
+                <a16:creationId xmlns:a16="http://schemas.microsoft.com/office/drawing/2014/main" id="{485C866E-2A1A-D34A-B3D3-C3EC0F969120}"/>
+              </a:ext>
+            </a:extLst>
+          </p:cNvPr>
+          <p:cNvPicPr>
+            <a:picLocks noChangeAspect="1"/>
+          </p:cNvPicPr>
+          <p:nvPr/>
+        </p:nvPicPr>
+        <p:blipFill>
+          <a:blip r:embed="rId3">
+            <a:extLst>
+              <a:ext uri="{28A0092B-C50C-407E-A947-70E740481C1C}">
+                <a14:useLocalDpi xmlns:a14="http://schemas.microsoft.com/office/drawing/2010/main" val="0"/>
+              </a:ext>
+            </a:extLst>
+          </a:blip>
+          <a:stretch>
+            <a:fillRect/>
+          </a:stretch>
+        </p:blipFill>
+        <p:spPr>
+          <a:xfrm>
+            <a:off x="9801412" y="4624575"/>
+            <a:ext cx="1552388" cy="1552388"/>
+          </a:xfrm>
+          <a:prstGeom prst="rect">
+            <a:avLst/>
+          </a:prstGeom>
+        </p:spPr>
+      </p:pic>
+    </p:spTree>
+    <p:extLst>
+      <p:ext uri="{BB962C8B-B14F-4D97-AF65-F5344CB8AC3E}">
+        <p14:creationId xmlns:p14="http://schemas.microsoft.com/office/powerpoint/2010/main" val="2914837206"/>
       </p:ext>
     </p:extLst>
   </p:cSld>

</xml_diff>

<commit_message>
Switch to using bottle as web framework
</commit_message>
<xml_diff>
--- a/Python Level 2/Lesson 7/Session 7.pptx
+++ b/Python Level 2/Lesson 7/Session 7.pptx
@@ -250,7 +250,7 @@
           <a:p>
             <a:fld id="{17EC7085-4ACF-E149-9313-E1E217828D9B}" type="datetimeFigureOut">
               <a:rPr lang="en-US" smtClean="0"/>
-              <a:t>11/6/18</a:t>
+              <a:t>3/10/19</a:t>
             </a:fld>
             <a:endParaRPr lang="en-US"/>
           </a:p>
@@ -418,7 +418,7 @@
           <a:p>
             <a:fld id="{17EC7085-4ACF-E149-9313-E1E217828D9B}" type="datetimeFigureOut">
               <a:rPr lang="en-US" smtClean="0"/>
-              <a:t>11/6/18</a:t>
+              <a:t>3/10/19</a:t>
             </a:fld>
             <a:endParaRPr lang="en-US"/>
           </a:p>
@@ -596,7 +596,7 @@
           <a:p>
             <a:fld id="{17EC7085-4ACF-E149-9313-E1E217828D9B}" type="datetimeFigureOut">
               <a:rPr lang="en-US" smtClean="0"/>
-              <a:t>11/6/18</a:t>
+              <a:t>3/10/19</a:t>
             </a:fld>
             <a:endParaRPr lang="en-US"/>
           </a:p>
@@ -764,7 +764,7 @@
           <a:p>
             <a:fld id="{17EC7085-4ACF-E149-9313-E1E217828D9B}" type="datetimeFigureOut">
               <a:rPr lang="en-US" smtClean="0"/>
-              <a:t>11/6/18</a:t>
+              <a:t>3/10/19</a:t>
             </a:fld>
             <a:endParaRPr lang="en-US"/>
           </a:p>
@@ -1009,7 +1009,7 @@
           <a:p>
             <a:fld id="{17EC7085-4ACF-E149-9313-E1E217828D9B}" type="datetimeFigureOut">
               <a:rPr lang="en-US" smtClean="0"/>
-              <a:t>11/6/18</a:t>
+              <a:t>3/10/19</a:t>
             </a:fld>
             <a:endParaRPr lang="en-US"/>
           </a:p>
@@ -1238,7 +1238,7 @@
           <a:p>
             <a:fld id="{17EC7085-4ACF-E149-9313-E1E217828D9B}" type="datetimeFigureOut">
               <a:rPr lang="en-US" smtClean="0"/>
-              <a:t>11/6/18</a:t>
+              <a:t>3/10/19</a:t>
             </a:fld>
             <a:endParaRPr lang="en-US"/>
           </a:p>
@@ -1602,7 +1602,7 @@
           <a:p>
             <a:fld id="{17EC7085-4ACF-E149-9313-E1E217828D9B}" type="datetimeFigureOut">
               <a:rPr lang="en-US" smtClean="0"/>
-              <a:t>11/6/18</a:t>
+              <a:t>3/10/19</a:t>
             </a:fld>
             <a:endParaRPr lang="en-US"/>
           </a:p>
@@ -1719,7 +1719,7 @@
           <a:p>
             <a:fld id="{17EC7085-4ACF-E149-9313-E1E217828D9B}" type="datetimeFigureOut">
               <a:rPr lang="en-US" smtClean="0"/>
-              <a:t>11/6/18</a:t>
+              <a:t>3/10/19</a:t>
             </a:fld>
             <a:endParaRPr lang="en-US"/>
           </a:p>
@@ -1814,7 +1814,7 @@
           <a:p>
             <a:fld id="{17EC7085-4ACF-E149-9313-E1E217828D9B}" type="datetimeFigureOut">
               <a:rPr lang="en-US" smtClean="0"/>
-              <a:t>11/6/18</a:t>
+              <a:t>3/10/19</a:t>
             </a:fld>
             <a:endParaRPr lang="en-US"/>
           </a:p>
@@ -2089,7 +2089,7 @@
           <a:p>
             <a:fld id="{17EC7085-4ACF-E149-9313-E1E217828D9B}" type="datetimeFigureOut">
               <a:rPr lang="en-US" smtClean="0"/>
-              <a:t>11/6/18</a:t>
+              <a:t>3/10/19</a:t>
             </a:fld>
             <a:endParaRPr lang="en-US"/>
           </a:p>
@@ -2341,7 +2341,7 @@
           <a:p>
             <a:fld id="{17EC7085-4ACF-E149-9313-E1E217828D9B}" type="datetimeFigureOut">
               <a:rPr lang="en-US" smtClean="0"/>
-              <a:t>11/6/18</a:t>
+              <a:t>3/10/19</a:t>
             </a:fld>
             <a:endParaRPr lang="en-US"/>
           </a:p>
@@ -2552,7 +2552,7 @@
           <a:p>
             <a:fld id="{17EC7085-4ACF-E149-9313-E1E217828D9B}" type="datetimeFigureOut">
               <a:rPr lang="en-US" smtClean="0"/>
-              <a:t>11/6/18</a:t>
+              <a:t>3/10/19</a:t>
             </a:fld>
             <a:endParaRPr lang="en-US"/>
           </a:p>
@@ -3184,7 +3184,13 @@
       </p:sp>
       <p:pic>
         <p:nvPicPr>
-          <p:cNvPr id="7" name="Content Placeholder 6"/>
+          <p:cNvPr id="9" name="Content Placeholder 8">
+            <a:extLst>
+              <a:ext uri="{FF2B5EF4-FFF2-40B4-BE49-F238E27FC236}">
+                <a16:creationId xmlns:a16="http://schemas.microsoft.com/office/drawing/2014/main" id="{237C8FA9-0104-FC40-BEA9-5A74B9ECEBD0}"/>
+              </a:ext>
+            </a:extLst>
+          </p:cNvPr>
           <p:cNvPicPr>
             <a:picLocks noGrp="1" noChangeAspect="1"/>
           </p:cNvPicPr>
@@ -3193,21 +3199,15 @@
           </p:nvPr>
         </p:nvPicPr>
         <p:blipFill>
-          <a:blip r:embed="rId2">
-            <a:extLst>
-              <a:ext uri="{28A0092B-C50C-407E-A947-70E740481C1C}">
-                <a14:useLocalDpi xmlns:a14="http://schemas.microsoft.com/office/drawing/2010/main" val="0"/>
-              </a:ext>
-            </a:extLst>
-          </a:blip>
+          <a:blip r:embed="rId2"/>
           <a:stretch>
             <a:fillRect/>
           </a:stretch>
         </p:blipFill>
         <p:spPr>
           <a:xfrm>
-            <a:off x="1835150" y="2147094"/>
-            <a:ext cx="8521700" cy="3708400"/>
+            <a:off x="838200" y="2597222"/>
+            <a:ext cx="10515600" cy="2808143"/>
           </a:xfrm>
         </p:spPr>
       </p:pic>
@@ -3511,7 +3511,7 @@
       </p:sp>
       <p:pic>
         <p:nvPicPr>
-          <p:cNvPr id="2" name="Picture 1"/>
+          <p:cNvPr id="4" name="Picture 3"/>
           <p:cNvPicPr>
             <a:picLocks noChangeAspect="1"/>
           </p:cNvPicPr>
@@ -3531,36 +3531,6 @@
         </p:blipFill>
         <p:spPr>
           <a:xfrm>
-            <a:off x="2593101" y="1457342"/>
-            <a:ext cx="7095557" cy="4350289"/>
-          </a:xfrm>
-          <a:prstGeom prst="rect">
-            <a:avLst/>
-          </a:prstGeom>
-        </p:spPr>
-      </p:pic>
-      <p:pic>
-        <p:nvPicPr>
-          <p:cNvPr id="4" name="Picture 3"/>
-          <p:cNvPicPr>
-            <a:picLocks noChangeAspect="1"/>
-          </p:cNvPicPr>
-          <p:nvPr/>
-        </p:nvPicPr>
-        <p:blipFill>
-          <a:blip r:embed="rId3">
-            <a:extLst>
-              <a:ext uri="{28A0092B-C50C-407E-A947-70E740481C1C}">
-                <a14:useLocalDpi xmlns:a14="http://schemas.microsoft.com/office/drawing/2010/main" val="0"/>
-              </a:ext>
-            </a:extLst>
-          </a:blip>
-          <a:stretch>
-            <a:fillRect/>
-          </a:stretch>
-        </p:blipFill>
-        <p:spPr>
-          <a:xfrm>
             <a:off x="9801412" y="4624575"/>
             <a:ext cx="1552388" cy="1552388"/>
           </a:xfrm>
@@ -3583,8 +3553,8 @@
         </p:nvSpPr>
         <p:spPr>
           <a:xfrm>
-            <a:off x="1882790" y="6127234"/>
-            <a:ext cx="8516177" cy="369332"/>
+            <a:off x="4942991" y="6127234"/>
+            <a:ext cx="2306016" cy="369332"/>
           </a:xfrm>
           <a:prstGeom prst="rect">
             <a:avLst/>
@@ -3599,16 +3569,41 @@
           <a:p>
             <a:r>
               <a:rPr lang="en-US" dirty="0"/>
-              <a:t>We beat our heads against Python 3.7 changes that broke the released version of </a:t>
-            </a:r>
-            <a:r>
-              <a:rPr lang="en-US" dirty="0" err="1"/>
-              <a:t>web.py</a:t>
-            </a:r>
-            <a:endParaRPr lang="en-US" dirty="0"/>
-          </a:p>
-        </p:txBody>
-      </p:sp>
+              <a:t>We built a web server!</a:t>
+            </a:r>
+          </a:p>
+        </p:txBody>
+      </p:sp>
+      <p:pic>
+        <p:nvPicPr>
+          <p:cNvPr id="7" name="Content Placeholder 6">
+            <a:extLst>
+              <a:ext uri="{FF2B5EF4-FFF2-40B4-BE49-F238E27FC236}">
+                <a16:creationId xmlns:a16="http://schemas.microsoft.com/office/drawing/2014/main" id="{6F1A95E1-0586-B547-BD49-100AC2B72C83}"/>
+              </a:ext>
+            </a:extLst>
+          </p:cNvPr>
+          <p:cNvPicPr>
+            <a:picLocks noChangeAspect="1"/>
+          </p:cNvPicPr>
+          <p:nvPr/>
+        </p:nvPicPr>
+        <p:blipFill>
+          <a:blip r:embed="rId3"/>
+          <a:stretch>
+            <a:fillRect/>
+          </a:stretch>
+        </p:blipFill>
+        <p:spPr>
+          <a:xfrm>
+            <a:off x="2005070" y="1640959"/>
+            <a:ext cx="8181859" cy="4351338"/>
+          </a:xfrm>
+          <a:prstGeom prst="rect">
+            <a:avLst/>
+          </a:prstGeom>
+        </p:spPr>
+      </p:pic>
     </p:spTree>
     <p:extLst>
       <p:ext uri="{BB962C8B-B14F-4D97-AF65-F5344CB8AC3E}">
@@ -3664,13 +3659,11 @@
       </p:sp>
       <p:pic>
         <p:nvPicPr>
-          <p:cNvPr id="4" name="Content Placeholder 3"/>
+          <p:cNvPr id="5" name="Picture 4"/>
           <p:cNvPicPr>
-            <a:picLocks noGrp="1" noChangeAspect="1"/>
+            <a:picLocks noChangeAspect="1"/>
           </p:cNvPicPr>
-          <p:nvPr>
-            <p:ph idx="1"/>
-          </p:nvPr>
+          <p:nvPr/>
         </p:nvPicPr>
         <p:blipFill>
           <a:blip r:embed="rId2">
@@ -3686,78 +3679,80 @@
         </p:blipFill>
         <p:spPr>
           <a:xfrm>
-            <a:off x="2108200" y="2150542"/>
-            <a:ext cx="7975600" cy="2997200"/>
-          </a:xfrm>
+            <a:off x="9801412" y="4624575"/>
+            <a:ext cx="1552388" cy="1552388"/>
+          </a:xfrm>
+          <a:prstGeom prst="rect">
+            <a:avLst/>
+          </a:prstGeom>
         </p:spPr>
       </p:pic>
+      <p:sp>
+        <p:nvSpPr>
+          <p:cNvPr id="3" name="TextBox 2"/>
+          <p:cNvSpPr txBox="1"/>
+          <p:nvPr/>
+        </p:nvSpPr>
+        <p:spPr>
+          <a:xfrm>
+            <a:off x="3304819" y="5607596"/>
+            <a:ext cx="5582362" cy="461665"/>
+          </a:xfrm>
+          <a:prstGeom prst="rect">
+            <a:avLst/>
+          </a:prstGeom>
+          <a:noFill/>
+        </p:spPr>
+        <p:txBody>
+          <a:bodyPr wrap="none" rtlCol="0">
+            <a:spAutoFit/>
+          </a:bodyPr>
+          <a:lstStyle/>
+          <a:p>
+            <a:r>
+              <a:rPr lang="en-US" sz="2400" dirty="0"/>
+              <a:t>Today’s code: http://</a:t>
+            </a:r>
+            <a:r>
+              <a:rPr lang="en-US" sz="2400" dirty="0" err="1"/>
+              <a:t>eca</a:t>
+            </a:r>
+            <a:r>
+              <a:rPr lang="en-US" sz="2400" dirty="0"/>
+              <a:t>-python/l2session7</a:t>
+            </a:r>
+          </a:p>
+        </p:txBody>
+      </p:sp>
       <p:pic>
         <p:nvPicPr>
-          <p:cNvPr id="5" name="Picture 4"/>
+          <p:cNvPr id="9" name="Content Placeholder 8">
+            <a:extLst>
+              <a:ext uri="{FF2B5EF4-FFF2-40B4-BE49-F238E27FC236}">
+                <a16:creationId xmlns:a16="http://schemas.microsoft.com/office/drawing/2014/main" id="{C55E8A5E-6827-794F-905D-E7E842E5AE48}"/>
+              </a:ext>
+            </a:extLst>
+          </p:cNvPr>
           <p:cNvPicPr>
-            <a:picLocks noChangeAspect="1"/>
+            <a:picLocks noGrp="1" noChangeAspect="1"/>
           </p:cNvPicPr>
-          <p:nvPr/>
+          <p:nvPr>
+            <p:ph idx="1"/>
+          </p:nvPr>
         </p:nvPicPr>
         <p:blipFill>
-          <a:blip r:embed="rId3">
-            <a:extLst>
-              <a:ext uri="{28A0092B-C50C-407E-A947-70E740481C1C}">
-                <a14:useLocalDpi xmlns:a14="http://schemas.microsoft.com/office/drawing/2010/main" val="0"/>
-              </a:ext>
-            </a:extLst>
-          </a:blip>
+          <a:blip r:embed="rId3"/>
           <a:stretch>
             <a:fillRect/>
           </a:stretch>
         </p:blipFill>
         <p:spPr>
           <a:xfrm>
-            <a:off x="9801412" y="4624575"/>
-            <a:ext cx="1552388" cy="1552388"/>
-          </a:xfrm>
-          <a:prstGeom prst="rect">
-            <a:avLst/>
-          </a:prstGeom>
+            <a:off x="863600" y="2001931"/>
+            <a:ext cx="10490200" cy="2311400"/>
+          </a:xfrm>
         </p:spPr>
       </p:pic>
-      <p:sp>
-        <p:nvSpPr>
-          <p:cNvPr id="3" name="TextBox 2"/>
-          <p:cNvSpPr txBox="1"/>
-          <p:nvPr/>
-        </p:nvSpPr>
-        <p:spPr>
-          <a:xfrm>
-            <a:off x="3304819" y="5607596"/>
-            <a:ext cx="5582362" cy="461665"/>
-          </a:xfrm>
-          <a:prstGeom prst="rect">
-            <a:avLst/>
-          </a:prstGeom>
-          <a:noFill/>
-        </p:spPr>
-        <p:txBody>
-          <a:bodyPr wrap="none" rtlCol="0">
-            <a:spAutoFit/>
-          </a:bodyPr>
-          <a:lstStyle/>
-          <a:p>
-            <a:r>
-              <a:rPr lang="en-US" sz="2400" dirty="0"/>
-              <a:t>Today’s code: http://</a:t>
-            </a:r>
-            <a:r>
-              <a:rPr lang="en-US" sz="2400" dirty="0" err="1"/>
-              <a:t>eca</a:t>
-            </a:r>
-            <a:r>
-              <a:rPr lang="en-US" sz="2400" dirty="0"/>
-              <a:t>-python/l2session7</a:t>
-            </a:r>
-          </a:p>
-        </p:txBody>
-      </p:sp>
     </p:spTree>
     <p:extLst>
       <p:ext uri="{BB962C8B-B14F-4D97-AF65-F5344CB8AC3E}">
@@ -4425,10 +4420,10 @@
       </p:sp>
       <p:pic>
         <p:nvPicPr>
-          <p:cNvPr id="11" name="Content Placeholder 10">
+          <p:cNvPr id="7" name="Content Placeholder 6">
             <a:extLst>
               <a:ext uri="{FF2B5EF4-FFF2-40B4-BE49-F238E27FC236}">
-                <a16:creationId xmlns:a16="http://schemas.microsoft.com/office/drawing/2014/main" id="{BEEEBB05-56A8-5C44-AD0F-E1DD48AC3DCB}"/>
+                <a16:creationId xmlns:a16="http://schemas.microsoft.com/office/drawing/2014/main" id="{F4AED88C-A243-7148-A722-E16CFB196AB8}"/>
               </a:ext>
             </a:extLst>
           </p:cNvPr>
@@ -4447,8 +4442,8 @@
         </p:blipFill>
         <p:spPr>
           <a:xfrm>
-            <a:off x="1876023" y="1690688"/>
-            <a:ext cx="8439953" cy="4351338"/>
+            <a:off x="1883027" y="1825625"/>
+            <a:ext cx="8425946" cy="4351338"/>
           </a:xfrm>
         </p:spPr>
       </p:pic>

</xml_diff>